<commit_message>
Updated with some minor edits
</commit_message>
<xml_diff>
--- a/2015-09-02 NDDNUG/Barcz-Business-Of-Software-2015-09-02.pptx
+++ b/2015-09-02 NDDNUG/Barcz-Business-Of-Software-2015-09-02.pptx
@@ -5,10 +5,10 @@
     <p:sldMasterId id="2147483648" r:id="rId1"/>
   </p:sldMasterIdLst>
   <p:notesMasterIdLst>
-    <p:notesMasterId r:id="rId50"/>
+    <p:notesMasterId r:id="rId51"/>
   </p:notesMasterIdLst>
   <p:handoutMasterIdLst>
-    <p:handoutMasterId r:id="rId51"/>
+    <p:handoutMasterId r:id="rId52"/>
   </p:handoutMasterIdLst>
   <p:sldIdLst>
     <p:sldId id="256" r:id="rId2"/>
@@ -59,11 +59,12 @@
     <p:sldId id="286" r:id="rId47"/>
     <p:sldId id="291" r:id="rId48"/>
     <p:sldId id="259" r:id="rId49"/>
+    <p:sldId id="321" r:id="rId50"/>
   </p:sldIdLst>
   <p:sldSz cx="9144000" cy="6858000" type="screen4x3"/>
   <p:notesSz cx="7010400" cy="9296400"/>
   <p:custDataLst>
-    <p:tags r:id="rId52"/>
+    <p:tags r:id="rId53"/>
   </p:custDataLst>
   <p:defaultTextStyle>
     <a:defPPr>
@@ -259,6 +260,7 @@
         <p14:section name="Resources" id="{7ED6FDDF-B974-4DF9-9040-0341548727AA}">
           <p14:sldIdLst>
             <p14:sldId id="259"/>
+            <p14:sldId id="321"/>
           </p14:sldIdLst>
         </p14:section>
       </p14:sectionLst>
@@ -6121,7 +6123,7 @@
                 <a:tabLst/>
                 <a:defRPr/>
               </a:pPr>
-              <a:t>September 1, 2015</a:t>
+              <a:t>September 2, 2015</a:t>
             </a:fld>
             <a:r>
               <a:rPr kumimoji="0" lang="en-US" sz="1200" b="1" i="0" u="none" strike="noStrike" kern="1200" cap="none" spc="0" normalizeH="0" baseline="0" noProof="0" dirty="0" smtClean="0">
@@ -6266,25 +6268,6 @@
               <a:tabLst/>
               <a:defRPr/>
             </a:pPr>
-            <a:r>
-              <a:rPr kumimoji="0" lang="en-US" sz="1200" b="1" i="0" u="none" strike="noStrike" kern="1200" cap="none" spc="0" normalizeH="0" baseline="0" noProof="0" dirty="0" smtClean="0">
-                <a:ln>
-                  <a:noFill/>
-                </a:ln>
-                <a:solidFill>
-                  <a:schemeClr val="bg1">
-                    <a:lumMod val="75000"/>
-                  </a:schemeClr>
-                </a:solidFill>
-                <a:effectLst/>
-                <a:uLnTx/>
-                <a:uFillTx/>
-                <a:latin typeface="Calibri" pitchFamily="34" charset="0"/>
-                <a:ea typeface="Arial" charset="0"/>
-                <a:cs typeface="Arial" charset="0"/>
-              </a:rPr>
-              <a:t>Privileged and Confidential. © 2015.</a:t>
-            </a:r>
             <a:endParaRPr kumimoji="0" lang="en-US" sz="1200" b="1" i="0" u="none" strike="noStrike" kern="1200" cap="none" spc="0" normalizeH="0" baseline="0" noProof="0" dirty="0">
               <a:ln>
                 <a:noFill/>
@@ -6915,7 +6898,6 @@
               <a:rPr lang="en-US" dirty="0" smtClean="0"/>
               <a:t>Net Income</a:t>
             </a:r>
-            <a:endParaRPr lang="en-US" dirty="0" smtClean="0"/>
           </a:p>
           <a:p>
             <a:pPr marL="342900" indent="-342900">
@@ -6924,11 +6906,7 @@
             </a:pPr>
             <a:r>
               <a:rPr lang="en-US" dirty="0" smtClean="0"/>
-              <a:t>Payback </a:t>
-            </a:r>
-            <a:r>
-              <a:rPr lang="en-US" dirty="0" smtClean="0"/>
-              <a:t>time</a:t>
+              <a:t>Payback time</a:t>
             </a:r>
           </a:p>
           <a:p>
@@ -6969,11 +6947,7 @@
             </a:pPr>
             <a:r>
               <a:rPr lang="en-US" dirty="0" smtClean="0"/>
-              <a:t>Internal Rate of Return (IRR</a:t>
-            </a:r>
-            <a:r>
-              <a:rPr lang="en-US" dirty="0" smtClean="0"/>
-              <a:t>)</a:t>
+              <a:t>Internal Rate of Return (IRR)</a:t>
             </a:r>
             <a:endParaRPr lang="en-US" dirty="0"/>
           </a:p>
@@ -10580,8 +10554,17 @@
           <a:p>
             <a:r>
               <a:rPr lang="en-US" i="1" dirty="0" smtClean="0"/>
-              <a:t>“When making an investment decision, if the internal rate of return (IRR) is greater than the hurdle rate the project should . Choosing this alternative is equivalent to receiving its NPV in cash today”</a:t>
-            </a:r>
+              <a:t>“When making an investment decision, if the internal rate of return (IRR) is greater than the hurdle rate the project should </a:t>
+            </a:r>
+            <a:r>
+              <a:rPr lang="en-US" i="1" dirty="0" smtClean="0"/>
+              <a:t>chosen</a:t>
+            </a:r>
+            <a:r>
+              <a:rPr lang="en-US" i="1" dirty="0" smtClean="0"/>
+              <a:t>.”</a:t>
+            </a:r>
+            <a:endParaRPr lang="en-US" i="1" dirty="0" smtClean="0"/>
           </a:p>
           <a:p>
             <a:endParaRPr lang="en-US" i="1" dirty="0"/>
@@ -12732,11 +12715,7 @@
           <a:p>
             <a:r>
               <a:rPr lang="en-US" b="0" dirty="0" smtClean="0"/>
-              <a:t>Past</a:t>
-            </a:r>
-            <a:r>
-              <a:rPr lang="en-US" b="0" dirty="0" smtClean="0"/>
-              <a:t>:</a:t>
+              <a:t>Past:</a:t>
             </a:r>
           </a:p>
           <a:p>
@@ -17022,11 +17001,7 @@
           <a:p>
             <a:r>
               <a:rPr lang="en-US" b="0" dirty="0" smtClean="0"/>
-              <a:t>Is </a:t>
-            </a:r>
-            <a:r>
-              <a:rPr lang="en-US" b="0" dirty="0" smtClean="0"/>
-              <a:t>the organizing logic for business processes and IT infrastructure reflecting the integration and standardization requirement of the company’s operating model. The enterprise architecture provides a long-term view of a company’s processes, systems, and technologies so that individual projects can build capabilities – not just fulfill immediate needs.</a:t>
+              <a:t>Is the organizing logic for business processes and IT infrastructure reflecting the integration and standardization requirement of the company’s operating model. The enterprise architecture provides a long-term view of a company’s processes, systems, and technologies so that individual projects can build capabilities – not just fulfill immediate needs.</a:t>
             </a:r>
           </a:p>
           <a:p>
@@ -17938,6 +17913,102 @@
     <p:extLst>
       <p:ext uri="{BB962C8B-B14F-4D97-AF65-F5344CB8AC3E}">
         <p14:creationId xmlns:p14="http://schemas.microsoft.com/office/powerpoint/2010/main" val="950379751"/>
+      </p:ext>
+    </p:extLst>
+  </p:cSld>
+  <p:clrMapOvr>
+    <a:masterClrMapping/>
+  </p:clrMapOvr>
+  <p:timing>
+    <p:tnLst>
+      <p:par>
+        <p:cTn id="1" dur="indefinite" restart="never" nodeType="tmRoot"/>
+      </p:par>
+    </p:tnLst>
+  </p:timing>
+</p:sld>
+</file>
+
+<file path=ppt/slides/slide49.xml><?xml version="1.0" encoding="utf-8"?>
+<p:sld xmlns:a="http://schemas.openxmlformats.org/drawingml/2006/main" xmlns:r="http://schemas.openxmlformats.org/officeDocument/2006/relationships" xmlns:p="http://schemas.openxmlformats.org/presentationml/2006/main">
+  <p:cSld>
+    <p:spTree>
+      <p:nvGrpSpPr>
+        <p:cNvPr id="1" name=""/>
+        <p:cNvGrpSpPr/>
+        <p:nvPr/>
+      </p:nvGrpSpPr>
+      <p:grpSpPr>
+        <a:xfrm>
+          <a:off x="0" y="0"/>
+          <a:ext cx="0" cy="0"/>
+          <a:chOff x="0" y="0"/>
+          <a:chExt cx="0" cy="0"/>
+        </a:xfrm>
+      </p:grpSpPr>
+      <p:sp>
+        <p:nvSpPr>
+          <p:cNvPr id="2" name="Title 1"/>
+          <p:cNvSpPr>
+            <a:spLocks noGrp="1"/>
+          </p:cNvSpPr>
+          <p:nvPr>
+            <p:ph type="title"/>
+          </p:nvPr>
+        </p:nvSpPr>
+        <p:spPr/>
+        <p:txBody>
+          <a:bodyPr/>
+          <a:lstStyle/>
+          <a:p>
+            <a:r>
+              <a:rPr lang="en-US" dirty="0" smtClean="0"/>
+              <a:t>Stay in Touch</a:t>
+            </a:r>
+            <a:endParaRPr lang="en-US" dirty="0"/>
+          </a:p>
+        </p:txBody>
+      </p:sp>
+      <p:sp>
+        <p:nvSpPr>
+          <p:cNvPr id="3" name="Content Placeholder 2"/>
+          <p:cNvSpPr>
+            <a:spLocks noGrp="1"/>
+          </p:cNvSpPr>
+          <p:nvPr>
+            <p:ph idx="1"/>
+          </p:nvPr>
+        </p:nvSpPr>
+        <p:spPr/>
+        <p:txBody>
+          <a:bodyPr/>
+          <a:lstStyle/>
+          <a:p>
+            <a:pPr algn="ctr"/>
+            <a:r>
+              <a:rPr lang="en-US" dirty="0"/>
+              <a:t>Twitter: @</a:t>
+            </a:r>
+            <a:r>
+              <a:rPr lang="en-US" dirty="0" err="1" smtClean="0"/>
+              <a:t>timbarcz</a:t>
+            </a:r>
+            <a:endParaRPr lang="en-US" dirty="0" smtClean="0"/>
+          </a:p>
+          <a:p>
+            <a:pPr algn="ctr"/>
+            <a:r>
+              <a:rPr lang="en-US" dirty="0" smtClean="0"/>
+              <a:t>Email: tim.barcz@magretailgroup.com</a:t>
+            </a:r>
+            <a:endParaRPr lang="en-US" dirty="0"/>
+          </a:p>
+        </p:txBody>
+      </p:sp>
+    </p:spTree>
+    <p:extLst>
+      <p:ext uri="{BB962C8B-B14F-4D97-AF65-F5344CB8AC3E}">
+        <p14:creationId xmlns:p14="http://schemas.microsoft.com/office/powerpoint/2010/main" val="516212080"/>
       </p:ext>
     </p:extLst>
   </p:cSld>

</xml_diff>